<commit_message>
refactor: clean up dead code and improve comment styling in pptx generator
</commit_message>
<xml_diff>
--- a/resources/NGS_GE_report_baseline.pptx
+++ b/resources/NGS_GE_report_baseline.pptx
@@ -213,7 +213,7 @@
             <a:fld id="{B0AF433D-ACB8-475A-9DBB-3D1EBDB4B826}" type="datetimeFigureOut">
               <a:rPr lang="ko-KR" altLang="en-US" smtClean="0"/>
               <a:pPr/>
-              <a:t>2026. 2. 24.</a:t>
+              <a:t>2026. 2. 27.</a:t>
             </a:fld>
             <a:endParaRPr lang="ko-KR" altLang="en-US"/>
           </a:p>
@@ -748,7 +748,7 @@
             <a:fld id="{6DD992CD-CDBB-40CF-A1EE-0B1B8B43A805}" type="datetimeFigureOut">
               <a:rPr lang="ko-KR" altLang="en-US" smtClean="0"/>
               <a:pPr/>
-              <a:t>2026. 2. 24.</a:t>
+              <a:t>2026. 2. 27.</a:t>
             </a:fld>
             <a:endParaRPr lang="ko-KR" altLang="en-US"/>
           </a:p>
@@ -913,7 +913,7 @@
             <a:fld id="{6DD992CD-CDBB-40CF-A1EE-0B1B8B43A805}" type="datetimeFigureOut">
               <a:rPr lang="ko-KR" altLang="en-US" smtClean="0"/>
               <a:pPr/>
-              <a:t>2026. 2. 24.</a:t>
+              <a:t>2026. 2. 27.</a:t>
             </a:fld>
             <a:endParaRPr lang="ko-KR" altLang="en-US"/>
           </a:p>
@@ -1088,7 +1088,7 @@
             <a:fld id="{6DD992CD-CDBB-40CF-A1EE-0B1B8B43A805}" type="datetimeFigureOut">
               <a:rPr lang="ko-KR" altLang="en-US" smtClean="0"/>
               <a:pPr/>
-              <a:t>2026. 2. 24.</a:t>
+              <a:t>2026. 2. 27.</a:t>
             </a:fld>
             <a:endParaRPr lang="ko-KR" altLang="en-US"/>
           </a:p>
@@ -1253,7 +1253,7 @@
             <a:fld id="{6DD992CD-CDBB-40CF-A1EE-0B1B8B43A805}" type="datetimeFigureOut">
               <a:rPr lang="ko-KR" altLang="en-US" smtClean="0"/>
               <a:pPr/>
-              <a:t>2026. 2. 24.</a:t>
+              <a:t>2026. 2. 27.</a:t>
             </a:fld>
             <a:endParaRPr lang="ko-KR" altLang="en-US"/>
           </a:p>
@@ -1495,7 +1495,7 @@
             <a:fld id="{6DD992CD-CDBB-40CF-A1EE-0B1B8B43A805}" type="datetimeFigureOut">
               <a:rPr lang="ko-KR" altLang="en-US" smtClean="0"/>
               <a:pPr/>
-              <a:t>2026. 2. 24.</a:t>
+              <a:t>2026. 2. 27.</a:t>
             </a:fld>
             <a:endParaRPr lang="ko-KR" altLang="en-US"/>
           </a:p>
@@ -1777,7 +1777,7 @@
             <a:fld id="{6DD992CD-CDBB-40CF-A1EE-0B1B8B43A805}" type="datetimeFigureOut">
               <a:rPr lang="ko-KR" altLang="en-US" smtClean="0"/>
               <a:pPr/>
-              <a:t>2026. 2. 24.</a:t>
+              <a:t>2026. 2. 27.</a:t>
             </a:fld>
             <a:endParaRPr lang="ko-KR" altLang="en-US"/>
           </a:p>
@@ -2198,7 +2198,7 @@
             <a:fld id="{6DD992CD-CDBB-40CF-A1EE-0B1B8B43A805}" type="datetimeFigureOut">
               <a:rPr lang="ko-KR" altLang="en-US" smtClean="0"/>
               <a:pPr/>
-              <a:t>2026. 2. 24.</a:t>
+              <a:t>2026. 2. 27.</a:t>
             </a:fld>
             <a:endParaRPr lang="ko-KR" altLang="en-US"/>
           </a:p>
@@ -2312,7 +2312,7 @@
             <a:fld id="{6DD992CD-CDBB-40CF-A1EE-0B1B8B43A805}" type="datetimeFigureOut">
               <a:rPr lang="ko-KR" altLang="en-US" smtClean="0"/>
               <a:pPr/>
-              <a:t>2026. 2. 24.</a:t>
+              <a:t>2026. 2. 27.</a:t>
             </a:fld>
             <a:endParaRPr lang="ko-KR" altLang="en-US"/>
           </a:p>
@@ -2404,7 +2404,7 @@
             <a:fld id="{6DD992CD-CDBB-40CF-A1EE-0B1B8B43A805}" type="datetimeFigureOut">
               <a:rPr lang="ko-KR" altLang="en-US" smtClean="0"/>
               <a:pPr/>
-              <a:t>2026. 2. 24.</a:t>
+              <a:t>2026. 2. 27.</a:t>
             </a:fld>
             <a:endParaRPr lang="ko-KR" altLang="en-US"/>
           </a:p>
@@ -2676,7 +2676,7 @@
             <a:fld id="{6DD992CD-CDBB-40CF-A1EE-0B1B8B43A805}" type="datetimeFigureOut">
               <a:rPr lang="ko-KR" altLang="en-US" smtClean="0"/>
               <a:pPr/>
-              <a:t>2026. 2. 24.</a:t>
+              <a:t>2026. 2. 27.</a:t>
             </a:fld>
             <a:endParaRPr lang="ko-KR" altLang="en-US"/>
           </a:p>
@@ -2925,7 +2925,7 @@
             <a:fld id="{6DD992CD-CDBB-40CF-A1EE-0B1B8B43A805}" type="datetimeFigureOut">
               <a:rPr lang="ko-KR" altLang="en-US" smtClean="0"/>
               <a:pPr/>
-              <a:t>2026. 2. 24.</a:t>
+              <a:t>2026. 2. 27.</a:t>
             </a:fld>
             <a:endParaRPr lang="ko-KR" altLang="en-US"/>
           </a:p>
@@ -3133,7 +3133,7 @@
             <a:fld id="{6DD992CD-CDBB-40CF-A1EE-0B1B8B43A805}" type="datetimeFigureOut">
               <a:rPr lang="ko-KR" altLang="en-US" smtClean="0"/>
               <a:pPr/>
-              <a:t>2026. 2. 24.</a:t>
+              <a:t>2026. 2. 27.</a:t>
             </a:fld>
             <a:endParaRPr lang="ko-KR" altLang="en-US"/>
           </a:p>

</xml_diff>